<commit_message>
Analysis of implied storage
- src.data.alternate_releases provides functions to calculate implied storage and calculate alternate releases based on storage and inflow
- added notebook analyzing implied storage when using original release data vs alternate releases (experiment 0)
- added implied storage plot for Model 1 (experiment 1d)
- updates to manuscript draft
</commit_message>
<xml_diff>
--- a/report/drafting/2_27_2024/Figures/Figure 2.pptx
+++ b/report/drafting/2_27_2024/Figures/Figure 2.pptx
@@ -104,6 +104,11 @@
       </a:defRPr>
     </a:lvl9pPr>
   </p:defaultTextStyle>
+  <p:extLst>
+    <p:ext uri="{EFAFB233-063F-42B5-8137-9DF3F51BA10A}">
+      <p15:sldGuideLst xmlns:p15="http://schemas.microsoft.com/office/powerpoint/2012/main"/>
+    </p:ext>
+  </p:extLst>
 </p:presentation>
 </file>
 
@@ -254,7 +259,7 @@
           <a:p>
             <a:fld id="{10EB7D7B-3DC6-4E17-8D75-EDA7E0961AEB}" type="datetimeFigureOut">
               <a:rPr lang="en-US" smtClean="0"/>
-              <a:t>2/28/2024</a:t>
+              <a:t>3/1/2024</a:t>
             </a:fld>
             <a:endParaRPr lang="en-US"/>
           </a:p>
@@ -452,7 +457,7 @@
           <a:p>
             <a:fld id="{10EB7D7B-3DC6-4E17-8D75-EDA7E0961AEB}" type="datetimeFigureOut">
               <a:rPr lang="en-US" smtClean="0"/>
-              <a:t>2/28/2024</a:t>
+              <a:t>3/1/2024</a:t>
             </a:fld>
             <a:endParaRPr lang="en-US"/>
           </a:p>
@@ -660,7 +665,7 @@
           <a:p>
             <a:fld id="{10EB7D7B-3DC6-4E17-8D75-EDA7E0961AEB}" type="datetimeFigureOut">
               <a:rPr lang="en-US" smtClean="0"/>
-              <a:t>2/28/2024</a:t>
+              <a:t>3/1/2024</a:t>
             </a:fld>
             <a:endParaRPr lang="en-US"/>
           </a:p>
@@ -858,7 +863,7 @@
           <a:p>
             <a:fld id="{10EB7D7B-3DC6-4E17-8D75-EDA7E0961AEB}" type="datetimeFigureOut">
               <a:rPr lang="en-US" smtClean="0"/>
-              <a:t>2/28/2024</a:t>
+              <a:t>3/1/2024</a:t>
             </a:fld>
             <a:endParaRPr lang="en-US"/>
           </a:p>
@@ -1133,7 +1138,7 @@
           <a:p>
             <a:fld id="{10EB7D7B-3DC6-4E17-8D75-EDA7E0961AEB}" type="datetimeFigureOut">
               <a:rPr lang="en-US" smtClean="0"/>
-              <a:t>2/28/2024</a:t>
+              <a:t>3/1/2024</a:t>
             </a:fld>
             <a:endParaRPr lang="en-US"/>
           </a:p>
@@ -1398,7 +1403,7 @@
           <a:p>
             <a:fld id="{10EB7D7B-3DC6-4E17-8D75-EDA7E0961AEB}" type="datetimeFigureOut">
               <a:rPr lang="en-US" smtClean="0"/>
-              <a:t>2/28/2024</a:t>
+              <a:t>3/1/2024</a:t>
             </a:fld>
             <a:endParaRPr lang="en-US"/>
           </a:p>
@@ -1810,7 +1815,7 @@
           <a:p>
             <a:fld id="{10EB7D7B-3DC6-4E17-8D75-EDA7E0961AEB}" type="datetimeFigureOut">
               <a:rPr lang="en-US" smtClean="0"/>
-              <a:t>2/28/2024</a:t>
+              <a:t>3/1/2024</a:t>
             </a:fld>
             <a:endParaRPr lang="en-US"/>
           </a:p>
@@ -1951,7 +1956,7 @@
           <a:p>
             <a:fld id="{10EB7D7B-3DC6-4E17-8D75-EDA7E0961AEB}" type="datetimeFigureOut">
               <a:rPr lang="en-US" smtClean="0"/>
-              <a:t>2/28/2024</a:t>
+              <a:t>3/1/2024</a:t>
             </a:fld>
             <a:endParaRPr lang="en-US"/>
           </a:p>
@@ -2064,7 +2069,7 @@
           <a:p>
             <a:fld id="{10EB7D7B-3DC6-4E17-8D75-EDA7E0961AEB}" type="datetimeFigureOut">
               <a:rPr lang="en-US" smtClean="0"/>
-              <a:t>2/28/2024</a:t>
+              <a:t>3/1/2024</a:t>
             </a:fld>
             <a:endParaRPr lang="en-US"/>
           </a:p>
@@ -2375,7 +2380,7 @@
           <a:p>
             <a:fld id="{10EB7D7B-3DC6-4E17-8D75-EDA7E0961AEB}" type="datetimeFigureOut">
               <a:rPr lang="en-US" smtClean="0"/>
-              <a:t>2/28/2024</a:t>
+              <a:t>3/1/2024</a:t>
             </a:fld>
             <a:endParaRPr lang="en-US"/>
           </a:p>
@@ -2663,7 +2668,7 @@
           <a:p>
             <a:fld id="{10EB7D7B-3DC6-4E17-8D75-EDA7E0961AEB}" type="datetimeFigureOut">
               <a:rPr lang="en-US" smtClean="0"/>
-              <a:t>2/28/2024</a:t>
+              <a:t>3/1/2024</a:t>
             </a:fld>
             <a:endParaRPr lang="en-US"/>
           </a:p>
@@ -2904,7 +2909,7 @@
           <a:p>
             <a:fld id="{10EB7D7B-3DC6-4E17-8D75-EDA7E0961AEB}" type="datetimeFigureOut">
               <a:rPr lang="en-US" smtClean="0"/>
-              <a:t>2/28/2024</a:t>
+              <a:t>3/1/2024</a:t>
             </a:fld>
             <a:endParaRPr lang="en-US"/>
           </a:p>
@@ -4466,43 +4471,47 @@
           <a:lstStyle/>
           <a:p>
             <a:r>
-              <a:rPr lang="en-US" sz="1200"/>
+              <a:rPr lang="en-US" sz="1200" dirty="0" err="1"/>
               <a:t>storage</a:t>
             </a:r>
             <a:r>
-              <a:rPr lang="en-US" sz="1200" i="0" baseline="-25000">
+              <a:rPr lang="en-US" sz="1200" i="0" baseline="-25000" dirty="0" err="1">
                 <a:latin typeface="+mj-lt"/>
               </a:rPr>
               <a:t>i</a:t>
             </a:r>
             <a:r>
-              <a:rPr lang="en-US" sz="1200"/>
+              <a:rPr lang="en-US" sz="1200" dirty="0"/>
               <a:t> = </a:t>
             </a:r>
           </a:p>
           <a:p>
             <a:r>
-              <a:rPr lang="en-US" sz="1200"/>
+              <a:rPr lang="en-US" sz="1200" dirty="0"/>
               <a:t>storage</a:t>
             </a:r>
             <a:r>
-              <a:rPr lang="en-US" sz="1200" baseline="-25000"/>
+              <a:rPr lang="en-US" sz="1200" baseline="-25000" dirty="0"/>
               <a:t>i-1 </a:t>
             </a:r>
             <a:r>
-              <a:rPr lang="en-US" sz="1200"/>
+              <a:rPr lang="en-US" sz="1200" dirty="0"/>
               <a:t>– release</a:t>
             </a:r>
             <a:r>
-              <a:rPr lang="en-US" sz="1200" baseline="-25000"/>
-              <a:t>i </a:t>
-            </a:r>
-            <a:r>
-              <a:rPr lang="en-US" sz="1200"/>
-              <a:t>+ inflow</a:t>
-            </a:r>
-            <a:r>
-              <a:rPr lang="en-US" sz="1200" baseline="-25000"/>
+              <a:rPr lang="en-US" sz="1200" baseline="-25000" dirty="0"/>
+              <a:t>i-1 </a:t>
+            </a:r>
+            <a:r>
+              <a:rPr lang="en-US" sz="1200" dirty="0"/>
+              <a:t>+ </a:t>
+            </a:r>
+            <a:r>
+              <a:rPr lang="en-US" sz="1200" dirty="0" err="1"/>
+              <a:t>inflow</a:t>
+            </a:r>
+            <a:r>
+              <a:rPr lang="en-US" sz="1200" baseline="-25000" dirty="0" err="1"/>
               <a:t>i</a:t>
             </a:r>
             <a:endParaRPr lang="en-US" sz="1200" baseline="-25000" dirty="0"/>

</xml_diff>